<commit_message>
update kurfassung und introduction
</commit_message>
<xml_diff>
--- a/images/results/HeXe-comparison-0-800-fs.pptx
+++ b/images/results/HeXe-comparison-0-800-fs.pptx
@@ -104,6 +104,11 @@
       </a:defRPr>
     </a:lvl9pPr>
   </p:defaultTextStyle>
+  <p:extLst>
+    <p:ext uri="{EFAFB233-063F-42B5-8137-9DF3F51BA10A}">
+      <p15:sldGuideLst xmlns:p15="http://schemas.microsoft.com/office/powerpoint/2012/main"/>
+    </p:ext>
+  </p:extLst>
 </p:presentation>
 </file>
 
@@ -238,7 +243,7 @@
           <a:p>
             <a:fld id="{EC92DC3A-AC7E-8D41-9B65-49FD0C420EF8}" type="datetimeFigureOut">
               <a:rPr lang="en-US" smtClean="0"/>
-              <a:t>12/12/16</a:t>
+              <a:t>3/14/17</a:t>
             </a:fld>
             <a:endParaRPr lang="en-US"/>
           </a:p>
@@ -408,7 +413,7 @@
           <a:p>
             <a:fld id="{EC92DC3A-AC7E-8D41-9B65-49FD0C420EF8}" type="datetimeFigureOut">
               <a:rPr lang="en-US" smtClean="0"/>
-              <a:t>12/12/16</a:t>
+              <a:t>3/14/17</a:t>
             </a:fld>
             <a:endParaRPr lang="en-US"/>
           </a:p>
@@ -588,7 +593,7 @@
           <a:p>
             <a:fld id="{EC92DC3A-AC7E-8D41-9B65-49FD0C420EF8}" type="datetimeFigureOut">
               <a:rPr lang="en-US" smtClean="0"/>
-              <a:t>12/12/16</a:t>
+              <a:t>3/14/17</a:t>
             </a:fld>
             <a:endParaRPr lang="en-US"/>
           </a:p>
@@ -758,7 +763,7 @@
           <a:p>
             <a:fld id="{EC92DC3A-AC7E-8D41-9B65-49FD0C420EF8}" type="datetimeFigureOut">
               <a:rPr lang="en-US" smtClean="0"/>
-              <a:t>12/12/16</a:t>
+              <a:t>3/14/17</a:t>
             </a:fld>
             <a:endParaRPr lang="en-US"/>
           </a:p>
@@ -1004,7 +1009,7 @@
           <a:p>
             <a:fld id="{EC92DC3A-AC7E-8D41-9B65-49FD0C420EF8}" type="datetimeFigureOut">
               <a:rPr lang="en-US" smtClean="0"/>
-              <a:t>12/12/16</a:t>
+              <a:t>3/14/17</a:t>
             </a:fld>
             <a:endParaRPr lang="en-US"/>
           </a:p>
@@ -1236,7 +1241,7 @@
           <a:p>
             <a:fld id="{EC92DC3A-AC7E-8D41-9B65-49FD0C420EF8}" type="datetimeFigureOut">
               <a:rPr lang="en-US" smtClean="0"/>
-              <a:t>12/12/16</a:t>
+              <a:t>3/14/17</a:t>
             </a:fld>
             <a:endParaRPr lang="en-US"/>
           </a:p>
@@ -1603,7 +1608,7 @@
           <a:p>
             <a:fld id="{EC92DC3A-AC7E-8D41-9B65-49FD0C420EF8}" type="datetimeFigureOut">
               <a:rPr lang="en-US" smtClean="0"/>
-              <a:t>12/12/16</a:t>
+              <a:t>3/14/17</a:t>
             </a:fld>
             <a:endParaRPr lang="en-US"/>
           </a:p>
@@ -1721,7 +1726,7 @@
           <a:p>
             <a:fld id="{EC92DC3A-AC7E-8D41-9B65-49FD0C420EF8}" type="datetimeFigureOut">
               <a:rPr lang="en-US" smtClean="0"/>
-              <a:t>12/12/16</a:t>
+              <a:t>3/14/17</a:t>
             </a:fld>
             <a:endParaRPr lang="en-US"/>
           </a:p>
@@ -1816,7 +1821,7 @@
           <a:p>
             <a:fld id="{EC92DC3A-AC7E-8D41-9B65-49FD0C420EF8}" type="datetimeFigureOut">
               <a:rPr lang="en-US" smtClean="0"/>
-              <a:t>12/12/16</a:t>
+              <a:t>3/14/17</a:t>
             </a:fld>
             <a:endParaRPr lang="en-US"/>
           </a:p>
@@ -2093,7 +2098,7 @@
           <a:p>
             <a:fld id="{EC92DC3A-AC7E-8D41-9B65-49FD0C420EF8}" type="datetimeFigureOut">
               <a:rPr lang="en-US" smtClean="0"/>
-              <a:t>12/12/16</a:t>
+              <a:t>3/14/17</a:t>
             </a:fld>
             <a:endParaRPr lang="en-US"/>
           </a:p>
@@ -2346,7 +2351,7 @@
           <a:p>
             <a:fld id="{EC92DC3A-AC7E-8D41-9B65-49FD0C420EF8}" type="datetimeFigureOut">
               <a:rPr lang="en-US" smtClean="0"/>
-              <a:t>12/12/16</a:t>
+              <a:t>3/14/17</a:t>
             </a:fld>
             <a:endParaRPr lang="en-US"/>
           </a:p>
@@ -2559,7 +2564,7 @@
           <a:p>
             <a:fld id="{EC92DC3A-AC7E-8D41-9B65-49FD0C420EF8}" type="datetimeFigureOut">
               <a:rPr lang="en-US" smtClean="0"/>
-              <a:t>12/12/16</a:t>
+              <a:t>3/14/17</a:t>
             </a:fld>
             <a:endParaRPr lang="en-US"/>
           </a:p>
@@ -3132,107 +3137,217 @@
             </p:txBody>
           </p:sp>
         </p:grpSp>
-        <p:sp>
-          <p:nvSpPr>
-            <p:cNvPr id="18" name="TextBox 17"/>
-            <p:cNvSpPr txBox="1"/>
-            <p:nvPr/>
-          </p:nvSpPr>
-          <p:spPr>
-            <a:xfrm>
-              <a:off x="9406320" y="1806974"/>
-              <a:ext cx="2240100" cy="1200329"/>
-            </a:xfrm>
-            <a:prstGeom prst="rect">
-              <a:avLst/>
-            </a:prstGeom>
-            <a:noFill/>
-          </p:spPr>
-          <p:txBody>
-            <a:bodyPr wrap="none" rtlCol="0">
-              <a:spAutoFit/>
-            </a:bodyPr>
-            <a:lstStyle/>
-            <a:p>
-              <a:r>
-                <a:rPr lang="en-US" dirty="0">
-                  <a:solidFill>
-                    <a:srgbClr val="FF0000"/>
-                  </a:solidFill>
-                </a:rPr>
-                <a:t>–</a:t>
-              </a:r>
-              <a:r>
-                <a:rPr lang="en-US" dirty="0"/>
-                <a:t> </a:t>
-              </a:r>
-              <a:r>
-                <a:rPr lang="en-US" dirty="0" smtClean="0"/>
-                <a:t>q</a:t>
-              </a:r>
-              <a:r>
-                <a:rPr lang="en-US" baseline="30000" dirty="0" smtClean="0"/>
-                <a:t>-4 </a:t>
-              </a:r>
-              <a:r>
-                <a:rPr lang="en-US" dirty="0" smtClean="0"/>
-                <a:t>fit</a:t>
-              </a:r>
-              <a:endParaRPr lang="en-US" baseline="30000" dirty="0"/>
-            </a:p>
-            <a:p>
-              <a:r>
-                <a:rPr lang="en-US" dirty="0" smtClean="0">
-                  <a:solidFill>
-                    <a:srgbClr val="FF9798"/>
-                  </a:solidFill>
-                </a:rPr>
-                <a:t>--</a:t>
-              </a:r>
-              <a:r>
-                <a:rPr lang="en-US" dirty="0" smtClean="0"/>
-                <a:t> scattering of sphere</a:t>
-              </a:r>
-              <a:endParaRPr lang="en-US" dirty="0"/>
-            </a:p>
-            <a:p>
-              <a:r>
-                <a:rPr lang="en-US" dirty="0" smtClean="0"/>
-                <a:t>• rear </a:t>
-              </a:r>
-              <a:r>
-                <a:rPr lang="en-US" dirty="0" err="1" smtClean="0"/>
-                <a:t>pnCCD</a:t>
-              </a:r>
-              <a:r>
-                <a:rPr lang="en-US" dirty="0" smtClean="0"/>
-                <a:t> data</a:t>
-              </a:r>
-            </a:p>
-            <a:p>
-              <a:r>
-                <a:rPr lang="en-US" dirty="0" smtClean="0">
-                  <a:solidFill>
-                    <a:srgbClr val="3E3D99"/>
-                  </a:solidFill>
-                </a:rPr>
-                <a:t>•</a:t>
-              </a:r>
-              <a:r>
-                <a:rPr lang="en-US" dirty="0" smtClean="0"/>
-                <a:t> front </a:t>
-              </a:r>
-              <a:r>
-                <a:rPr lang="en-US" dirty="0" err="1" smtClean="0"/>
-                <a:t>pnCCD</a:t>
-              </a:r>
-              <a:r>
-                <a:rPr lang="en-US" dirty="0" smtClean="0"/>
-                <a:t> data</a:t>
-              </a:r>
-            </a:p>
-          </p:txBody>
-        </p:sp>
+        <mc:AlternateContent xmlns:mc="http://schemas.openxmlformats.org/markup-compatibility/2006">
+          <mc:Choice xmlns:a14="http://schemas.microsoft.com/office/drawing/2010/main" Requires="a14">
+            <p:sp>
+              <p:nvSpPr>
+                <p:cNvPr id="18" name="TextBox 17"/>
+                <p:cNvSpPr txBox="1"/>
+                <p:nvPr/>
+              </p:nvSpPr>
+              <p:spPr>
+                <a:xfrm>
+                  <a:off x="9406320" y="1806974"/>
+                  <a:ext cx="2240100" cy="1259640"/>
+                </a:xfrm>
+                <a:prstGeom prst="rect">
+                  <a:avLst/>
+                </a:prstGeom>
+                <a:noFill/>
+              </p:spPr>
+              <p:txBody>
+                <a:bodyPr wrap="none" rtlCol="0">
+                  <a:spAutoFit/>
+                </a:bodyPr>
+                <a:lstStyle/>
+                <a:p>
+                  <a:r>
+                    <a:rPr lang="en-US" dirty="0" smtClean="0">
+                      <a:solidFill>
+                        <a:srgbClr val="FF0000"/>
+                      </a:solidFill>
+                    </a:rPr>
+                    <a:t>–</a:t>
+                  </a:r>
+                  <a14:m>
+                    <m:oMath xmlns:m="http://schemas.openxmlformats.org/officeDocument/2006/math">
+                      <m:r>
+                        <a:rPr lang="de-DE" i="1">
+                          <a:solidFill>
+                            <a:srgbClr val="FF0000"/>
+                          </a:solidFill>
+                          <a:latin typeface="Cambria Math" charset="0"/>
+                        </a:rPr>
+                        <m:t> </m:t>
+                      </m:r>
+                      <m:sSup>
+                        <m:sSupPr>
+                          <m:ctrlPr>
+                            <a:rPr lang="de-DE" b="0" i="1" smtClean="0">
+                              <a:solidFill>
+                                <a:schemeClr val="tx1"/>
+                              </a:solidFill>
+                              <a:latin typeface="Cambria Math" charset="0"/>
+                            </a:rPr>
+                          </m:ctrlPr>
+                        </m:sSupPr>
+                        <m:e>
+                          <m:r>
+                            <a:rPr lang="de-DE" b="0" i="1" smtClean="0">
+                              <a:solidFill>
+                                <a:schemeClr val="tx1"/>
+                              </a:solidFill>
+                              <a:latin typeface="Cambria Math" charset="0"/>
+                            </a:rPr>
+                            <m:t>|</m:t>
+                          </m:r>
+                          <m:acc>
+                            <m:accPr>
+                              <m:chr m:val="⃗"/>
+                              <m:ctrlPr>
+                                <a:rPr lang="de-DE" b="0" i="1" smtClean="0">
+                                  <a:solidFill>
+                                    <a:schemeClr val="tx1"/>
+                                  </a:solidFill>
+                                  <a:latin typeface="Cambria Math" charset="0"/>
+                                </a:rPr>
+                              </m:ctrlPr>
+                            </m:accPr>
+                            <m:e>
+                              <m:r>
+                                <a:rPr lang="de-DE" b="0" i="1" smtClean="0">
+                                  <a:solidFill>
+                                    <a:schemeClr val="tx1"/>
+                                  </a:solidFill>
+                                  <a:latin typeface="Cambria Math" charset="0"/>
+                                </a:rPr>
+                                <m:t>𝑄</m:t>
+                              </m:r>
+                            </m:e>
+                          </m:acc>
+                          <m:r>
+                            <a:rPr lang="de-DE" b="0" i="1" smtClean="0">
+                              <a:solidFill>
+                                <a:schemeClr val="tx1"/>
+                              </a:solidFill>
+                              <a:latin typeface="Cambria Math" charset="0"/>
+                            </a:rPr>
+                            <m:t>|</m:t>
+                          </m:r>
+                        </m:e>
+                        <m:sup>
+                          <m:r>
+                            <a:rPr lang="de-DE" b="0" i="1" smtClean="0">
+                              <a:solidFill>
+                                <a:schemeClr val="tx1"/>
+                              </a:solidFill>
+                              <a:latin typeface="Cambria Math" charset="0"/>
+                            </a:rPr>
+                            <m:t>−4</m:t>
+                          </m:r>
+                        </m:sup>
+                      </m:sSup>
+                    </m:oMath>
+                  </a14:m>
+                  <a:r>
+                    <a:rPr lang="en-US" dirty="0" smtClean="0"/>
+                    <a:t>fit</a:t>
+                  </a:r>
+                  <a:endParaRPr lang="en-US" baseline="30000" dirty="0"/>
+                </a:p>
+                <a:p>
+                  <a:r>
+                    <a:rPr lang="en-US" dirty="0" smtClean="0">
+                      <a:solidFill>
+                        <a:srgbClr val="FF9798"/>
+                      </a:solidFill>
+                    </a:rPr>
+                    <a:t>--</a:t>
+                  </a:r>
+                  <a:r>
+                    <a:rPr lang="en-US" dirty="0" smtClean="0"/>
+                    <a:t> scattering of sphere</a:t>
+                  </a:r>
+                  <a:endParaRPr lang="en-US" dirty="0"/>
+                </a:p>
+                <a:p>
+                  <a:r>
+                    <a:rPr lang="en-US" dirty="0" smtClean="0"/>
+                    <a:t>• rear </a:t>
+                  </a:r>
+                  <a:r>
+                    <a:rPr lang="en-US" dirty="0" err="1" smtClean="0"/>
+                    <a:t>pnCCD</a:t>
+                  </a:r>
+                  <a:r>
+                    <a:rPr lang="en-US" dirty="0" smtClean="0"/>
+                    <a:t> data</a:t>
+                  </a:r>
+                </a:p>
+                <a:p>
+                  <a:r>
+                    <a:rPr lang="en-US" dirty="0" smtClean="0">
+                      <a:solidFill>
+                        <a:srgbClr val="3E3D99"/>
+                      </a:solidFill>
+                    </a:rPr>
+                    <a:t>•</a:t>
+                  </a:r>
+                  <a:r>
+                    <a:rPr lang="en-US" dirty="0" smtClean="0"/>
+                    <a:t> front </a:t>
+                  </a:r>
+                  <a:r>
+                    <a:rPr lang="en-US" dirty="0" err="1" smtClean="0"/>
+                    <a:t>pnCCD</a:t>
+                  </a:r>
+                  <a:r>
+                    <a:rPr lang="en-US" dirty="0" smtClean="0"/>
+                    <a:t> data</a:t>
+                  </a:r>
+                </a:p>
+              </p:txBody>
+            </p:sp>
+          </mc:Choice>
+          <mc:Fallback>
+            <p:sp>
+              <p:nvSpPr>
+                <p:cNvPr id="18" name="TextBox 17"/>
+                <p:cNvSpPr txBox="1">
+                  <a:spLocks noRot="1" noChangeAspect="1" noMove="1" noResize="1" noEditPoints="1" noAdjustHandles="1" noChangeArrowheads="1" noChangeShapeType="1" noTextEdit="1"/>
+                </p:cNvSpPr>
+                <p:nvPr/>
+              </p:nvSpPr>
+              <p:spPr>
+                <a:xfrm>
+                  <a:off x="9406320" y="1806974"/>
+                  <a:ext cx="2240100" cy="1259640"/>
+                </a:xfrm>
+                <a:prstGeom prst="rect">
+                  <a:avLst/>
+                </a:prstGeom>
+                <a:blipFill rotWithShape="0">
+                  <a:blip r:embed="rId4"/>
+                  <a:stretch>
+                    <a:fillRect l="-2174" t="-25121" r="-1902" b="-4831"/>
+                  </a:stretch>
+                </a:blipFill>
+              </p:spPr>
+              <p:txBody>
+                <a:bodyPr/>
+                <a:lstStyle/>
+                <a:p>
+                  <a:r>
+                    <a:rPr lang="en-US">
+                      <a:noFill/>
+                    </a:rPr>
+                    <a:t> </a:t>
+                  </a:r>
+                </a:p>
+              </p:txBody>
+            </p:sp>
+          </mc:Fallback>
+        </mc:AlternateContent>
       </p:grpSp>
     </p:spTree>
     <p:extLst>

</xml_diff>